<commit_message>
Added rest of users
Needs images representing donator and admin, perhaps some mention of database functionality for admin?
</commit_message>
<xml_diff>
--- a/Prototype/USVH.pptx
+++ b/Prototype/USVH.pptx
@@ -7,6 +7,8 @@
   <p:sldIdLst>
     <p:sldId id="256" r:id="rId2"/>
     <p:sldId id="257" r:id="rId3"/>
+    <p:sldId id="258" r:id="rId4"/>
+    <p:sldId id="259" r:id="rId5"/>
   </p:sldIdLst>
   <p:sldSz cx="12192000" cy="6858000"/>
   <p:notesSz cx="6858000" cy="9144000"/>
@@ -121,50 +123,6 @@
 </p1510:revInfo>
 </file>
 
-<file path=ppt/changesInfos/changesInfo1.xml><?xml version="1.0" encoding="utf-8"?>
-<pc:chgInfo xmlns:a="http://schemas.openxmlformats.org/drawingml/2006/main" xmlns:r="http://schemas.openxmlformats.org/officeDocument/2006/relationships" xmlns:ac="http://schemas.microsoft.com/office/drawing/2013/main/command" xmlns:pc="http://schemas.microsoft.com/office/powerpoint/2013/main/command">
-  <pc:docChgLst>
-    <pc:chgData name="Jake Mortimer" userId="d3e41ce58c69e8b5" providerId="LiveId" clId="{E2F8E726-C47D-4B72-8157-112B51BD28A1}"/>
-    <pc:docChg chg="custSel modSld">
-      <pc:chgData name="Jake Mortimer" userId="d3e41ce58c69e8b5" providerId="LiveId" clId="{E2F8E726-C47D-4B72-8157-112B51BD28A1}" dt="2018-11-30T12:32:23.884" v="1683" actId="1076"/>
-      <pc:docMkLst>
-        <pc:docMk/>
-      </pc:docMkLst>
-      <pc:sldChg chg="addSp modSp">
-        <pc:chgData name="Jake Mortimer" userId="d3e41ce58c69e8b5" providerId="LiveId" clId="{E2F8E726-C47D-4B72-8157-112B51BD28A1}" dt="2018-11-30T12:30:02.141" v="1133" actId="20577"/>
-        <pc:sldMkLst>
-          <pc:docMk/>
-          <pc:sldMk cId="1344645106" sldId="256"/>
-        </pc:sldMkLst>
-        <pc:spChg chg="add mod">
-          <ac:chgData name="Jake Mortimer" userId="d3e41ce58c69e8b5" providerId="LiveId" clId="{E2F8E726-C47D-4B72-8157-112B51BD28A1}" dt="2018-11-30T12:30:02.141" v="1133" actId="20577"/>
-          <ac:spMkLst>
-            <pc:docMk/>
-            <pc:sldMk cId="1344645106" sldId="256"/>
-            <ac:spMk id="2" creationId="{A6EF79B0-E778-44C6-8665-90B0E34BF5B3}"/>
-          </ac:spMkLst>
-        </pc:spChg>
-      </pc:sldChg>
-      <pc:sldChg chg="addSp modSp">
-        <pc:chgData name="Jake Mortimer" userId="d3e41ce58c69e8b5" providerId="LiveId" clId="{E2F8E726-C47D-4B72-8157-112B51BD28A1}" dt="2018-11-30T12:32:23.884" v="1683" actId="1076"/>
-        <pc:sldMkLst>
-          <pc:docMk/>
-          <pc:sldMk cId="2134654508" sldId="257"/>
-        </pc:sldMkLst>
-        <pc:spChg chg="add mod">
-          <ac:chgData name="Jake Mortimer" userId="d3e41ce58c69e8b5" providerId="LiveId" clId="{E2F8E726-C47D-4B72-8157-112B51BD28A1}" dt="2018-11-30T12:32:23.884" v="1683" actId="1076"/>
-          <ac:spMkLst>
-            <pc:docMk/>
-            <pc:sldMk cId="2134654508" sldId="257"/>
-            <ac:spMk id="3" creationId="{E91E3D7B-E31F-4666-BF68-CC24ABC5BB63}"/>
-          </ac:spMkLst>
-        </pc:spChg>
-      </pc:sldChg>
-    </pc:docChg>
-  </pc:docChgLst>
-</pc:chgInfo>
-</file>
-
 <file path=ppt/slideLayouts/slideLayout1.xml><?xml version="1.0" encoding="utf-8"?>
 <p:sldLayout xmlns:a="http://schemas.openxmlformats.org/drawingml/2006/main" xmlns:r="http://schemas.openxmlformats.org/officeDocument/2006/relationships" xmlns:p="http://schemas.openxmlformats.org/presentationml/2006/main" type="title" preserve="1">
   <p:cSld name="Title Slide">
@@ -314,7 +272,7 @@
           <a:p>
             <a:fld id="{1BD68747-B727-43F9-99EF-A16133981C66}" type="datetimeFigureOut">
               <a:rPr lang="en-GB" smtClean="0"/>
-              <a:t>30/11/2018</a:t>
+              <a:t>03/12/2018</a:t>
             </a:fld>
             <a:endParaRPr lang="en-GB"/>
           </a:p>
@@ -514,7 +472,7 @@
           <a:p>
             <a:fld id="{1BD68747-B727-43F9-99EF-A16133981C66}" type="datetimeFigureOut">
               <a:rPr lang="en-GB" smtClean="0"/>
-              <a:t>30/11/2018</a:t>
+              <a:t>03/12/2018</a:t>
             </a:fld>
             <a:endParaRPr lang="en-GB"/>
           </a:p>
@@ -724,7 +682,7 @@
           <a:p>
             <a:fld id="{1BD68747-B727-43F9-99EF-A16133981C66}" type="datetimeFigureOut">
               <a:rPr lang="en-GB" smtClean="0"/>
-              <a:t>30/11/2018</a:t>
+              <a:t>03/12/2018</a:t>
             </a:fld>
             <a:endParaRPr lang="en-GB"/>
           </a:p>
@@ -924,7 +882,7 @@
           <a:p>
             <a:fld id="{1BD68747-B727-43F9-99EF-A16133981C66}" type="datetimeFigureOut">
               <a:rPr lang="en-GB" smtClean="0"/>
-              <a:t>30/11/2018</a:t>
+              <a:t>03/12/2018</a:t>
             </a:fld>
             <a:endParaRPr lang="en-GB"/>
           </a:p>
@@ -1200,7 +1158,7 @@
           <a:p>
             <a:fld id="{1BD68747-B727-43F9-99EF-A16133981C66}" type="datetimeFigureOut">
               <a:rPr lang="en-GB" smtClean="0"/>
-              <a:t>30/11/2018</a:t>
+              <a:t>03/12/2018</a:t>
             </a:fld>
             <a:endParaRPr lang="en-GB"/>
           </a:p>
@@ -1468,7 +1426,7 @@
           <a:p>
             <a:fld id="{1BD68747-B727-43F9-99EF-A16133981C66}" type="datetimeFigureOut">
               <a:rPr lang="en-GB" smtClean="0"/>
-              <a:t>30/11/2018</a:t>
+              <a:t>03/12/2018</a:t>
             </a:fld>
             <a:endParaRPr lang="en-GB"/>
           </a:p>
@@ -1883,7 +1841,7 @@
           <a:p>
             <a:fld id="{1BD68747-B727-43F9-99EF-A16133981C66}" type="datetimeFigureOut">
               <a:rPr lang="en-GB" smtClean="0"/>
-              <a:t>30/11/2018</a:t>
+              <a:t>03/12/2018</a:t>
             </a:fld>
             <a:endParaRPr lang="en-GB"/>
           </a:p>
@@ -2025,7 +1983,7 @@
           <a:p>
             <a:fld id="{1BD68747-B727-43F9-99EF-A16133981C66}" type="datetimeFigureOut">
               <a:rPr lang="en-GB" smtClean="0"/>
-              <a:t>30/11/2018</a:t>
+              <a:t>03/12/2018</a:t>
             </a:fld>
             <a:endParaRPr lang="en-GB"/>
           </a:p>
@@ -2138,7 +2096,7 @@
           <a:p>
             <a:fld id="{1BD68747-B727-43F9-99EF-A16133981C66}" type="datetimeFigureOut">
               <a:rPr lang="en-GB" smtClean="0"/>
-              <a:t>30/11/2018</a:t>
+              <a:t>03/12/2018</a:t>
             </a:fld>
             <a:endParaRPr lang="en-GB"/>
           </a:p>
@@ -2451,7 +2409,7 @@
           <a:p>
             <a:fld id="{1BD68747-B727-43F9-99EF-A16133981C66}" type="datetimeFigureOut">
               <a:rPr lang="en-GB" smtClean="0"/>
-              <a:t>30/11/2018</a:t>
+              <a:t>03/12/2018</a:t>
             </a:fld>
             <a:endParaRPr lang="en-GB"/>
           </a:p>
@@ -2740,7 +2698,7 @@
           <a:p>
             <a:fld id="{1BD68747-B727-43F9-99EF-A16133981C66}" type="datetimeFigureOut">
               <a:rPr lang="en-GB" smtClean="0"/>
-              <a:t>30/11/2018</a:t>
+              <a:t>03/12/2018</a:t>
             </a:fld>
             <a:endParaRPr lang="en-GB"/>
           </a:p>
@@ -2983,7 +2941,7 @@
           <a:p>
             <a:fld id="{1BD68747-B727-43F9-99EF-A16133981C66}" type="datetimeFigureOut">
               <a:rPr lang="en-GB" smtClean="0"/>
-              <a:t>30/11/2018</a:t>
+              <a:t>03/12/2018</a:t>
             </a:fld>
             <a:endParaRPr lang="en-GB"/>
           </a:p>
@@ -3697,6 +3655,234 @@
 </p:sld>
 </file>
 
+<file path=ppt/slides/slide3.xml><?xml version="1.0" encoding="utf-8"?>
+<p:sld xmlns:a="http://schemas.openxmlformats.org/drawingml/2006/main" xmlns:r="http://schemas.openxmlformats.org/officeDocument/2006/relationships" xmlns:p="http://schemas.openxmlformats.org/presentationml/2006/main">
+  <p:cSld>
+    <p:spTree>
+      <p:nvGrpSpPr>
+        <p:cNvPr id="1" name=""/>
+        <p:cNvGrpSpPr/>
+        <p:nvPr/>
+      </p:nvGrpSpPr>
+      <p:grpSpPr>
+        <a:xfrm>
+          <a:off x="0" y="0"/>
+          <a:ext cx="0" cy="0"/>
+          <a:chOff x="0" y="0"/>
+          <a:chExt cx="0" cy="0"/>
+        </a:xfrm>
+      </p:grpSpPr>
+      <p:sp>
+        <p:nvSpPr>
+          <p:cNvPr id="3" name="TextBox 2">
+            <a:extLst>
+              <a:ext uri="{FF2B5EF4-FFF2-40B4-BE49-F238E27FC236}">
+                <a16:creationId xmlns:a16="http://schemas.microsoft.com/office/drawing/2014/main" id="{E91E3D7B-E31F-4666-BF68-CC24ABC5BB63}"/>
+              </a:ext>
+            </a:extLst>
+          </p:cNvPr>
+          <p:cNvSpPr txBox="1"/>
+          <p:nvPr/>
+        </p:nvSpPr>
+        <p:spPr>
+          <a:xfrm>
+            <a:off x="3538072" y="267412"/>
+            <a:ext cx="8568764" cy="6432530"/>
+          </a:xfrm>
+          <a:prstGeom prst="rect">
+            <a:avLst/>
+          </a:prstGeom>
+          <a:noFill/>
+        </p:spPr>
+        <p:txBody>
+          <a:bodyPr wrap="square" rtlCol="0">
+            <a:spAutoFit/>
+          </a:bodyPr>
+          <a:lstStyle/>
+          <a:p>
+            <a:r>
+              <a:rPr lang="en-GB" sz="2800" dirty="0"/>
+              <a:t>User Type: </a:t>
+            </a:r>
+            <a:r>
+              <a:rPr lang="en-GB" sz="2800" b="1" dirty="0"/>
+              <a:t>Potential donator</a:t>
+            </a:r>
+          </a:p>
+          <a:p>
+            <a:endParaRPr lang="en-GB" sz="2400" b="1" dirty="0"/>
+          </a:p>
+          <a:p>
+            <a:r>
+              <a:rPr lang="en-GB" sz="2400" dirty="0"/>
+              <a:t>User Story: </a:t>
+            </a:r>
+            <a:r>
+              <a:rPr lang="en-GB" sz="2400" b="1" dirty="0"/>
+              <a:t>A potential donator might not have the time to volunteer but would still like to help the charity, they should be able to see the work the charity does through stories and images, and how their donation would help those in need.</a:t>
+            </a:r>
+          </a:p>
+          <a:p>
+            <a:endParaRPr lang="en-GB" sz="2400" b="1" dirty="0"/>
+          </a:p>
+          <a:p>
+            <a:r>
+              <a:rPr lang="en-GB" sz="2400" dirty="0"/>
+              <a:t>Scenario: </a:t>
+            </a:r>
+            <a:r>
+              <a:rPr lang="en-GB" sz="2400" b="1" dirty="0"/>
+              <a:t>When I am browsing the website, if I go onto the about us and testimonials pages I should be able to see what the charity does and how my donation will contribute to maintain and grow the charity and it’s work. If I choose to donate this should be easy to do and not compromise any of my personal payment details.</a:t>
+            </a:r>
+          </a:p>
+          <a:p>
+            <a:endParaRPr lang="en-GB" sz="2400" dirty="0"/>
+          </a:p>
+          <a:p>
+            <a:r>
+              <a:rPr lang="en-GB" sz="2400" dirty="0"/>
+              <a:t>Additional Information: </a:t>
+            </a:r>
+            <a:r>
+              <a:rPr lang="en-GB" sz="2400" b="1" dirty="0"/>
+              <a:t>Money transfers will be handled by </a:t>
+            </a:r>
+            <a:r>
+              <a:rPr lang="en-GB" sz="2400" b="1" dirty="0" err="1"/>
+              <a:t>Paypal</a:t>
+            </a:r>
+            <a:r>
+              <a:rPr lang="en-GB" sz="2400" b="1" dirty="0"/>
+              <a:t> or similar service which provide a safe, secure and trusted platform</a:t>
+            </a:r>
+          </a:p>
+          <a:p>
+            <a:endParaRPr lang="en-GB" sz="2400" dirty="0"/>
+          </a:p>
+        </p:txBody>
+      </p:sp>
+    </p:spTree>
+    <p:extLst>
+      <p:ext uri="{BB962C8B-B14F-4D97-AF65-F5344CB8AC3E}">
+        <p14:creationId xmlns:p14="http://schemas.microsoft.com/office/powerpoint/2010/main" val="2274234175"/>
+      </p:ext>
+    </p:extLst>
+  </p:cSld>
+  <p:clrMapOvr>
+    <a:masterClrMapping/>
+  </p:clrMapOvr>
+</p:sld>
+</file>
+
+<file path=ppt/slides/slide4.xml><?xml version="1.0" encoding="utf-8"?>
+<p:sld xmlns:a="http://schemas.openxmlformats.org/drawingml/2006/main" xmlns:r="http://schemas.openxmlformats.org/officeDocument/2006/relationships" xmlns:p="http://schemas.openxmlformats.org/presentationml/2006/main">
+  <p:cSld>
+    <p:spTree>
+      <p:nvGrpSpPr>
+        <p:cNvPr id="1" name=""/>
+        <p:cNvGrpSpPr/>
+        <p:nvPr/>
+      </p:nvGrpSpPr>
+      <p:grpSpPr>
+        <a:xfrm>
+          <a:off x="0" y="0"/>
+          <a:ext cx="0" cy="0"/>
+          <a:chOff x="0" y="0"/>
+          <a:chExt cx="0" cy="0"/>
+        </a:xfrm>
+      </p:grpSpPr>
+      <p:sp>
+        <p:nvSpPr>
+          <p:cNvPr id="3" name="TextBox 2">
+            <a:extLst>
+              <a:ext uri="{FF2B5EF4-FFF2-40B4-BE49-F238E27FC236}">
+                <a16:creationId xmlns:a16="http://schemas.microsoft.com/office/drawing/2014/main" id="{E91E3D7B-E31F-4666-BF68-CC24ABC5BB63}"/>
+              </a:ext>
+            </a:extLst>
+          </p:cNvPr>
+          <p:cNvSpPr txBox="1"/>
+          <p:nvPr/>
+        </p:nvSpPr>
+        <p:spPr>
+          <a:xfrm>
+            <a:off x="3538072" y="267412"/>
+            <a:ext cx="8568764" cy="5324535"/>
+          </a:xfrm>
+          <a:prstGeom prst="rect">
+            <a:avLst/>
+          </a:prstGeom>
+          <a:noFill/>
+        </p:spPr>
+        <p:txBody>
+          <a:bodyPr wrap="square" rtlCol="0">
+            <a:spAutoFit/>
+          </a:bodyPr>
+          <a:lstStyle/>
+          <a:p>
+            <a:r>
+              <a:rPr lang="en-GB" sz="2800" dirty="0"/>
+              <a:t>User Type: </a:t>
+            </a:r>
+            <a:r>
+              <a:rPr lang="en-GB" sz="2800" b="1" dirty="0"/>
+              <a:t>Website administrator</a:t>
+            </a:r>
+          </a:p>
+          <a:p>
+            <a:endParaRPr lang="en-GB" sz="2400" b="1" dirty="0"/>
+          </a:p>
+          <a:p>
+            <a:r>
+              <a:rPr lang="en-GB" sz="2400" dirty="0"/>
+              <a:t>User Story: </a:t>
+            </a:r>
+            <a:r>
+              <a:rPr lang="en-GB" sz="2400" b="1" dirty="0"/>
+              <a:t>A website administrator needs to be able to maintain by posting, editing and deleting events, blog posts, testimonials, as well as edit other pages to make sure important information like contact details is always up to date.</a:t>
+            </a:r>
+          </a:p>
+          <a:p>
+            <a:endParaRPr lang="en-GB" sz="2400" b="1" dirty="0"/>
+          </a:p>
+          <a:p>
+            <a:r>
+              <a:rPr lang="en-GB" sz="2400" dirty="0"/>
+              <a:t>Scenario: </a:t>
+            </a:r>
+            <a:r>
+              <a:rPr lang="en-GB" sz="2400" b="1" dirty="0"/>
+              <a:t>I need to be able to securely log in to the administrator’s panel and from there edit the content of each page of the website, this will then update the website on submission.</a:t>
+            </a:r>
+          </a:p>
+          <a:p>
+            <a:endParaRPr lang="en-GB" sz="2400" dirty="0"/>
+          </a:p>
+          <a:p>
+            <a:r>
+              <a:rPr lang="en-GB" sz="2400" dirty="0"/>
+              <a:t>Additional Information: </a:t>
+            </a:r>
+            <a:r>
+              <a:rPr lang="en-GB" sz="2400" b="1" dirty="0"/>
+              <a:t>The administrator’s panel will be accessible through a different URL to the main website and require a username and password to authenticate the user.</a:t>
+            </a:r>
+            <a:endParaRPr lang="en-GB" sz="2400" dirty="0"/>
+          </a:p>
+        </p:txBody>
+      </p:sp>
+    </p:spTree>
+    <p:extLst>
+      <p:ext uri="{BB962C8B-B14F-4D97-AF65-F5344CB8AC3E}">
+        <p14:creationId xmlns:p14="http://schemas.microsoft.com/office/powerpoint/2010/main" val="61286683"/>
+      </p:ext>
+    </p:extLst>
+  </p:cSld>
+  <p:clrMapOvr>
+    <a:masterClrMapping/>
+  </p:clrMapOvr>
+</p:sld>
+</file>
+
 <file path=ppt/theme/theme1.xml><?xml version="1.0" encoding="utf-8"?>
 <a:theme xmlns:a="http://schemas.openxmlformats.org/drawingml/2006/main" name="Office Theme">
   <a:themeElements>

</xml_diff>